<commit_message>
updates bayes and knn
</commit_message>
<xml_diff>
--- a/clases/Cap04_Clasificacion/presentations/PAT04_KNN.pptx
+++ b/clases/Cap04_Clasificacion/presentations/PAT04_KNN.pptx
@@ -5,7 +5,7 @@
     <p:sldMasterId id="2147483648" r:id="rId1"/>
   </p:sldMasterIdLst>
   <p:notesMasterIdLst>
-    <p:notesMasterId r:id="rId13"/>
+    <p:notesMasterId r:id="rId16"/>
   </p:notesMasterIdLst>
   <p:sldIdLst>
     <p:sldId id="294" r:id="rId2"/>
@@ -19,6 +19,9 @@
     <p:sldId id="291" r:id="rId10"/>
     <p:sldId id="293" r:id="rId11"/>
     <p:sldId id="292" r:id="rId12"/>
+    <p:sldId id="297" r:id="rId13"/>
+    <p:sldId id="295" r:id="rId14"/>
+    <p:sldId id="296" r:id="rId15"/>
   </p:sldIdLst>
   <p:sldSz cx="9144000" cy="6858000" type="screen4x3"/>
   <p:notesSz cx="6858000" cy="9144000"/>
@@ -8941,6 +8944,202 @@
     <p:extLst>
       <p:ext uri="{BB962C8B-B14F-4D97-AF65-F5344CB8AC3E}">
         <p14:creationId xmlns:p14="http://schemas.microsoft.com/office/powerpoint/2010/main" val="3284784657"/>
+      </p:ext>
+    </p:extLst>
+  </p:cSld>
+  <p:clrMapOvr>
+    <a:masterClrMapping/>
+  </p:clrMapOvr>
+  <p:timing>
+    <p:tnLst>
+      <p:par>
+        <p:cTn id="1" dur="indefinite" restart="never" nodeType="tmRoot"/>
+      </p:par>
+    </p:tnLst>
+  </p:timing>
+</p:sld>
+</file>
+
+<file path=ppt/slides/slide12.xml><?xml version="1.0" encoding="utf-8"?>
+<p:sld xmlns:a="http://schemas.openxmlformats.org/drawingml/2006/main" xmlns:r="http://schemas.openxmlformats.org/officeDocument/2006/relationships" xmlns:p="http://schemas.openxmlformats.org/presentationml/2006/main">
+  <p:cSld>
+    <p:spTree>
+      <p:nvGrpSpPr>
+        <p:cNvPr id="1" name=""/>
+        <p:cNvGrpSpPr/>
+        <p:nvPr/>
+      </p:nvGrpSpPr>
+      <p:grpSpPr>
+        <a:xfrm>
+          <a:off x="0" y="0"/>
+          <a:ext cx="0" cy="0"/>
+          <a:chOff x="0" y="0"/>
+          <a:chExt cx="0" cy="0"/>
+        </a:xfrm>
+      </p:grpSpPr>
+      <p:sp>
+        <p:nvSpPr>
+          <p:cNvPr id="2" name="Title 1"/>
+          <p:cNvSpPr>
+            <a:spLocks noGrp="1"/>
+          </p:cNvSpPr>
+          <p:nvPr>
+            <p:ph type="title"/>
+          </p:nvPr>
+        </p:nvSpPr>
+        <p:spPr>
+          <a:xfrm>
+            <a:off x="427703" y="2486896"/>
+            <a:ext cx="8229600" cy="1143000"/>
+          </a:xfrm>
+        </p:spPr>
+        <p:txBody>
+          <a:bodyPr/>
+          <a:lstStyle/>
+          <a:p>
+            <a:r>
+              <a:rPr lang="en-US" dirty="0" smtClean="0"/>
+              <a:t>Example with 80 million images</a:t>
+            </a:r>
+            <a:endParaRPr lang="en-US" dirty="0"/>
+          </a:p>
+        </p:txBody>
+      </p:sp>
+    </p:spTree>
+    <p:extLst>
+      <p:ext uri="{BB962C8B-B14F-4D97-AF65-F5344CB8AC3E}">
+        <p14:creationId xmlns:p14="http://schemas.microsoft.com/office/powerpoint/2010/main" val="868810421"/>
+      </p:ext>
+    </p:extLst>
+  </p:cSld>
+  <p:clrMapOvr>
+    <a:masterClrMapping/>
+  </p:clrMapOvr>
+</p:sld>
+</file>
+
+<file path=ppt/slides/slide13.xml><?xml version="1.0" encoding="utf-8"?>
+<p:sld xmlns:a="http://schemas.openxmlformats.org/drawingml/2006/main" xmlns:r="http://schemas.openxmlformats.org/officeDocument/2006/relationships" xmlns:p="http://schemas.openxmlformats.org/presentationml/2006/main">
+  <p:cSld>
+    <p:bg>
+      <p:bgPr>
+        <a:solidFill>
+          <a:schemeClr val="tx1"/>
+        </a:solidFill>
+        <a:effectLst/>
+      </p:bgPr>
+    </p:bg>
+    <p:spTree>
+      <p:nvGrpSpPr>
+        <p:cNvPr id="1" name=""/>
+        <p:cNvGrpSpPr/>
+        <p:nvPr/>
+      </p:nvGrpSpPr>
+      <p:grpSpPr>
+        <a:xfrm>
+          <a:off x="0" y="0"/>
+          <a:ext cx="0" cy="0"/>
+          <a:chOff x="0" y="0"/>
+          <a:chExt cx="0" cy="0"/>
+        </a:xfrm>
+      </p:grpSpPr>
+      <p:pic>
+        <p:nvPicPr>
+          <p:cNvPr id="2" name="Imagen 1" descr="Screen Shot 2013-05-14 at 9.15.43 AM.png"/>
+          <p:cNvPicPr>
+            <a:picLocks noChangeAspect="1"/>
+          </p:cNvPicPr>
+          <p:nvPr/>
+        </p:nvPicPr>
+        <p:blipFill>
+          <a:blip r:embed="rId2"/>
+          <a:stretch>
+            <a:fillRect/>
+          </a:stretch>
+        </p:blipFill>
+        <p:spPr>
+          <a:xfrm>
+            <a:off x="1952553" y="0"/>
+            <a:ext cx="5238893" cy="6858000"/>
+          </a:xfrm>
+          <a:prstGeom prst="rect">
+            <a:avLst/>
+          </a:prstGeom>
+        </p:spPr>
+      </p:pic>
+    </p:spTree>
+    <p:extLst>
+      <p:ext uri="{BB962C8B-B14F-4D97-AF65-F5344CB8AC3E}">
+        <p14:creationId xmlns:p14="http://schemas.microsoft.com/office/powerpoint/2010/main" val="1748163533"/>
+      </p:ext>
+    </p:extLst>
+  </p:cSld>
+  <p:clrMapOvr>
+    <a:masterClrMapping/>
+  </p:clrMapOvr>
+  <p:timing>
+    <p:tnLst>
+      <p:par>
+        <p:cTn id="1" dur="indefinite" restart="never" nodeType="tmRoot"/>
+      </p:par>
+    </p:tnLst>
+  </p:timing>
+</p:sld>
+</file>
+
+<file path=ppt/slides/slide14.xml><?xml version="1.0" encoding="utf-8"?>
+<p:sld xmlns:a="http://schemas.openxmlformats.org/drawingml/2006/main" xmlns:r="http://schemas.openxmlformats.org/officeDocument/2006/relationships" xmlns:p="http://schemas.openxmlformats.org/presentationml/2006/main">
+  <p:cSld>
+    <p:bg>
+      <p:bgPr>
+        <a:solidFill>
+          <a:schemeClr val="tx1"/>
+        </a:solidFill>
+        <a:effectLst/>
+      </p:bgPr>
+    </p:bg>
+    <p:spTree>
+      <p:nvGrpSpPr>
+        <p:cNvPr id="1" name=""/>
+        <p:cNvGrpSpPr/>
+        <p:nvPr/>
+      </p:nvGrpSpPr>
+      <p:grpSpPr>
+        <a:xfrm>
+          <a:off x="0" y="0"/>
+          <a:ext cx="0" cy="0"/>
+          <a:chOff x="0" y="0"/>
+          <a:chExt cx="0" cy="0"/>
+        </a:xfrm>
+      </p:grpSpPr>
+      <p:pic>
+        <p:nvPicPr>
+          <p:cNvPr id="2" name="Imagen 1" descr="Screen Shot 2013-05-14 at 9.15.31 AM.png"/>
+          <p:cNvPicPr>
+            <a:picLocks noChangeAspect="1"/>
+          </p:cNvPicPr>
+          <p:nvPr/>
+        </p:nvPicPr>
+        <p:blipFill>
+          <a:blip r:embed="rId2"/>
+          <a:stretch>
+            <a:fillRect/>
+          </a:stretch>
+        </p:blipFill>
+        <p:spPr>
+          <a:xfrm>
+            <a:off x="1846791" y="0"/>
+            <a:ext cx="5450417" cy="6858000"/>
+          </a:xfrm>
+          <a:prstGeom prst="rect">
+            <a:avLst/>
+          </a:prstGeom>
+        </p:spPr>
+      </p:pic>
+    </p:spTree>
+    <p:extLst>
+      <p:ext uri="{BB962C8B-B14F-4D97-AF65-F5344CB8AC3E}">
+        <p14:creationId xmlns:p14="http://schemas.microsoft.com/office/powerpoint/2010/main" val="1660724524"/>
       </p:ext>
     </p:extLst>
   </p:cSld>

</xml_diff>